<commit_message>
Presentacion y poster version final
</commit_message>
<xml_diff>
--- a/PresentacionCancerDeMama.pptx
+++ b/PresentacionCancerDeMama.pptx
@@ -5,10 +5,10 @@
     <p:sldMasterId id="2147483660" r:id="rId4"/>
   </p:sldMasterIdLst>
   <p:notesMasterIdLst>
-    <p:notesMasterId r:id="rId17"/>
+    <p:notesMasterId r:id="rId18"/>
   </p:notesMasterIdLst>
   <p:handoutMasterIdLst>
-    <p:handoutMasterId r:id="rId18"/>
+    <p:handoutMasterId r:id="rId19"/>
   </p:handoutMasterIdLst>
   <p:sldIdLst>
     <p:sldId id="278" r:id="rId5"/>
@@ -23,6 +23,7 @@
     <p:sldId id="287" r:id="rId14"/>
     <p:sldId id="288" r:id="rId15"/>
     <p:sldId id="289" r:id="rId16"/>
+    <p:sldId id="290" r:id="rId17"/>
   </p:sldIdLst>
   <p:sldSz cx="12192000" cy="6858000"/>
   <p:notesSz cx="6858000" cy="9144000"/>
@@ -6818,7 +6819,7 @@
           </a:effectLst>
           <a:extLst>
             <a:ext uri="{91240B29-F687-4f45-9708-019B960494DF}">
-              <a14:hiddenLine xmlns="" xmlns:a14="http://schemas.microsoft.com/office/drawing/2010/main" xmlns:a16="http://schemas.microsoft.com/office/drawing/2014/main" xmlns:p14="http://schemas.microsoft.com/office/powerpoint/2010/main" w="9525">
+              <a14:hiddenLine xmlns:p14="http://schemas.microsoft.com/office/powerpoint/2010/main" xmlns:a16="http://schemas.microsoft.com/office/drawing/2014/main" xmlns:a14="http://schemas.microsoft.com/office/drawing/2010/main" xmlns="" w="9525">
                 <a:solidFill>
                   <a:srgbClr val="000000"/>
                 </a:solidFill>
@@ -7468,6 +7469,96 @@
 </p:sld>
 </file>
 
+<file path=ppt/slides/slide13.xml><?xml version="1.0" encoding="utf-8"?>
+<p:sld xmlns:a="http://schemas.openxmlformats.org/drawingml/2006/main" xmlns:r="http://schemas.openxmlformats.org/officeDocument/2006/relationships" xmlns:p="http://schemas.openxmlformats.org/presentationml/2006/main">
+  <p:cSld>
+    <p:spTree>
+      <p:nvGrpSpPr>
+        <p:cNvPr id="1" name=""/>
+        <p:cNvGrpSpPr/>
+        <p:nvPr/>
+      </p:nvGrpSpPr>
+      <p:grpSpPr>
+        <a:xfrm>
+          <a:off x="0" y="0"/>
+          <a:ext cx="0" cy="0"/>
+          <a:chOff x="0" y="0"/>
+          <a:chExt cx="0" cy="0"/>
+        </a:xfrm>
+      </p:grpSpPr>
+      <p:pic>
+        <p:nvPicPr>
+          <p:cNvPr id="3" name="Imagen 2">
+            <a:extLst>
+              <a:ext uri="{FF2B5EF4-FFF2-40B4-BE49-F238E27FC236}">
+                <a16:creationId xmlns:a16="http://schemas.microsoft.com/office/drawing/2014/main" id="{B708CD16-0B96-6B6D-31B4-7C043E770008}"/>
+              </a:ext>
+            </a:extLst>
+          </p:cNvPr>
+          <p:cNvPicPr>
+            <a:picLocks noChangeAspect="1"/>
+          </p:cNvPicPr>
+          <p:nvPr/>
+        </p:nvPicPr>
+        <p:blipFill>
+          <a:blip r:embed="rId2"/>
+          <a:stretch>
+            <a:fillRect/>
+          </a:stretch>
+        </p:blipFill>
+        <p:spPr>
+          <a:xfrm>
+            <a:off x="4008580" y="-129308"/>
+            <a:ext cx="5060805" cy="3806744"/>
+          </a:xfrm>
+          <a:prstGeom prst="rect">
+            <a:avLst/>
+          </a:prstGeom>
+        </p:spPr>
+      </p:pic>
+      <p:pic>
+        <p:nvPicPr>
+          <p:cNvPr id="5" name="Imagen 4">
+            <a:extLst>
+              <a:ext uri="{FF2B5EF4-FFF2-40B4-BE49-F238E27FC236}">
+                <a16:creationId xmlns:a16="http://schemas.microsoft.com/office/drawing/2014/main" id="{9705EC2B-DD4A-F641-7F2F-401492862722}"/>
+              </a:ext>
+            </a:extLst>
+          </p:cNvPr>
+          <p:cNvPicPr>
+            <a:picLocks noChangeAspect="1"/>
+          </p:cNvPicPr>
+          <p:nvPr/>
+        </p:nvPicPr>
+        <p:blipFill>
+          <a:blip r:embed="rId3"/>
+          <a:stretch>
+            <a:fillRect/>
+          </a:stretch>
+        </p:blipFill>
+        <p:spPr>
+          <a:xfrm>
+            <a:off x="4008580" y="3677436"/>
+            <a:ext cx="5060805" cy="3367505"/>
+          </a:xfrm>
+          <a:prstGeom prst="rect">
+            <a:avLst/>
+          </a:prstGeom>
+        </p:spPr>
+      </p:pic>
+    </p:spTree>
+    <p:extLst>
+      <p:ext uri="{BB962C8B-B14F-4D97-AF65-F5344CB8AC3E}">
+        <p14:creationId xmlns:p14="http://schemas.microsoft.com/office/powerpoint/2010/main" val="952852835"/>
+      </p:ext>
+    </p:extLst>
+  </p:cSld>
+  <p:clrMapOvr>
+    <a:masterClrMapping/>
+  </p:clrMapOvr>
+</p:sld>
+</file>
+
 <file path=ppt/slides/slide2.xml><?xml version="1.0" encoding="utf-8"?>
 <p:sld xmlns:a="http://schemas.openxmlformats.org/drawingml/2006/main" xmlns:r="http://schemas.openxmlformats.org/officeDocument/2006/relationships" xmlns:p="http://schemas.openxmlformats.org/presentationml/2006/main">
   <p:cSld>
@@ -8131,15 +8222,6 @@
           <a:solidFill>
             <a:srgbClr val="FFFFFF"/>
           </a:solidFill>
-          <a:extLst>
-            <a:ext uri="{909E8E84-426E-40DD-AFC4-6F175D3DCCD1}">
-              <a14:hiddenFill xmlns:a14="http://schemas.microsoft.com/office/drawing/2010/main">
-                <a:solidFill>
-                  <a:srgbClr val="FFFFFF"/>
-                </a:solidFill>
-              </a14:hiddenFill>
-            </a:ext>
-          </a:extLst>
         </p:spPr>
       </p:pic>
     </p:spTree>
@@ -9232,7 +9314,7 @@
         </p:nvSpPr>
         <p:spPr>
           <a:xfrm>
-            <a:off x="913795" y="609600"/>
+            <a:off x="494381" y="-190829"/>
             <a:ext cx="10353762" cy="1261872"/>
           </a:xfrm>
         </p:spPr>
@@ -9271,8 +9353,8 @@
         </p:blipFill>
         <p:spPr>
           <a:xfrm>
-            <a:off x="1530880" y="2076450"/>
-            <a:ext cx="3622671" cy="3622671"/>
+            <a:off x="364537" y="508388"/>
+            <a:ext cx="3191883" cy="3191883"/>
           </a:xfrm>
           <a:prstGeom prst="rect">
             <a:avLst/>
@@ -9298,29 +9380,40 @@
         </p:nvSpPr>
         <p:spPr>
           <a:xfrm>
-            <a:off x="6410716" y="2076451"/>
-            <a:ext cx="4856841" cy="3622672"/>
+            <a:off x="185133" y="3700272"/>
+            <a:ext cx="3815316" cy="2845808"/>
           </a:xfrm>
         </p:spPr>
         <p:txBody>
           <a:bodyPr anchor="t">
-            <a:normAutofit/>
+            <a:normAutofit fontScale="77500" lnSpcReduction="20000"/>
           </a:bodyPr>
           <a:lstStyle/>
           <a:p>
-            <a:r>
-              <a:rPr lang="es-GT" dirty="0" err="1"/>
-              <a:t>Precision</a:t>
-            </a:r>
+            <a:pPr marL="36900" indent="0">
+              <a:buNone/>
+            </a:pPr>
             <a:r>
               <a:rPr lang="es-GT" dirty="0"/>
-              <a:t> de 92.98%</a:t>
+              <a:t>Modelo 1</a:t>
             </a:r>
           </a:p>
           <a:p>
             <a:r>
               <a:rPr lang="es-GT" dirty="0"/>
-              <a:t>Pocos casos de falsos negativos</a:t>
+              <a:t>Precisión de 92.98%</a:t>
+            </a:r>
+          </a:p>
+          <a:p>
+            <a:r>
+              <a:rPr lang="es-GT" dirty="0"/>
+              <a:t>Ningún casos de falsos negativos</a:t>
+            </a:r>
+          </a:p>
+          <a:p>
+            <a:r>
+              <a:rPr lang="es-GT" dirty="0"/>
+              <a:t>Bastantes casos de falsos positivos</a:t>
             </a:r>
           </a:p>
           <a:p>
@@ -9343,6 +9436,465 @@
           </a:p>
         </p:txBody>
       </p:sp>
+      <p:sp>
+        <p:nvSpPr>
+          <p:cNvPr id="7" name="Marcador de contenido 2">
+            <a:extLst>
+              <a:ext uri="{FF2B5EF4-FFF2-40B4-BE49-F238E27FC236}">
+                <a16:creationId xmlns:a16="http://schemas.microsoft.com/office/drawing/2014/main" id="{1EA42912-9BA3-21D7-463E-DEDB13843D06}"/>
+              </a:ext>
+            </a:extLst>
+          </p:cNvPr>
+          <p:cNvSpPr txBox="1">
+            <a:spLocks/>
+          </p:cNvSpPr>
+          <p:nvPr/>
+        </p:nvSpPr>
+        <p:spPr>
+          <a:xfrm>
+            <a:off x="7786103" y="4012133"/>
+            <a:ext cx="3815316" cy="2845808"/>
+          </a:xfrm>
+          <a:prstGeom prst="rect">
+            <a:avLst/>
+          </a:prstGeom>
+          <a:effectLst>
+            <a:outerShdw blurRad="25400" dir="17880000">
+              <a:srgbClr val="000000">
+                <a:alpha val="46000"/>
+              </a:srgbClr>
+            </a:outerShdw>
+          </a:effectLst>
+        </p:spPr>
+        <p:txBody>
+          <a:bodyPr vert="horz" lIns="91440" tIns="45720" rIns="91440" bIns="45720" rtlCol="0" anchor="t">
+            <a:normAutofit fontScale="77500" lnSpcReduction="20000"/>
+          </a:bodyPr>
+          <a:lstStyle>
+            <a:lvl1pPr marL="342900" indent="-306000" algn="l" defTabSz="457200" rtl="0" eaLnBrk="1" latinLnBrk="0" hangingPunct="1">
+              <a:lnSpc>
+                <a:spcPct val="110000"/>
+              </a:lnSpc>
+              <a:spcBef>
+                <a:spcPct val="20000"/>
+              </a:spcBef>
+              <a:spcAft>
+                <a:spcPts val="600"/>
+              </a:spcAft>
+              <a:buClr>
+                <a:schemeClr val="tx2"/>
+              </a:buClr>
+              <a:buSzPct val="70000"/>
+              <a:buFont typeface="Wingdings 2" charset="2"/>
+              <a:buChar char=""/>
+              <a:defRPr sz="2300" kern="1200">
+                <a:ln>
+                  <a:solidFill>
+                    <a:schemeClr val="bg1">
+                      <a:lumMod val="75000"/>
+                      <a:lumOff val="25000"/>
+                      <a:alpha val="10000"/>
+                    </a:schemeClr>
+                  </a:solidFill>
+                </a:ln>
+                <a:solidFill>
+                  <a:schemeClr val="tx2"/>
+                </a:solidFill>
+                <a:effectLst>
+                  <a:outerShdw blurRad="9525" dist="25400" dir="14640000" algn="tl" rotWithShape="0">
+                    <a:schemeClr val="bg1">
+                      <a:alpha val="30000"/>
+                    </a:schemeClr>
+                  </a:outerShdw>
+                </a:effectLst>
+                <a:latin typeface="+mn-lt"/>
+                <a:ea typeface="+mn-ea"/>
+                <a:cs typeface="+mn-cs"/>
+              </a:defRPr>
+            </a:lvl1pPr>
+            <a:lvl2pPr marL="720000" indent="-270000" algn="l" defTabSz="457200" rtl="0" eaLnBrk="1" latinLnBrk="0" hangingPunct="1">
+              <a:spcBef>
+                <a:spcPct val="20000"/>
+              </a:spcBef>
+              <a:spcAft>
+                <a:spcPts val="600"/>
+              </a:spcAft>
+              <a:buClr>
+                <a:schemeClr val="tx2"/>
+              </a:buClr>
+              <a:buSzPct val="70000"/>
+              <a:buFont typeface="Wingdings 2" charset="2"/>
+              <a:buChar char=""/>
+              <a:defRPr sz="2100" kern="1200">
+                <a:ln>
+                  <a:solidFill>
+                    <a:schemeClr val="bg1">
+                      <a:lumMod val="75000"/>
+                      <a:lumOff val="25000"/>
+                      <a:alpha val="10000"/>
+                    </a:schemeClr>
+                  </a:solidFill>
+                </a:ln>
+                <a:solidFill>
+                  <a:schemeClr val="tx2"/>
+                </a:solidFill>
+                <a:effectLst>
+                  <a:outerShdw blurRad="9525" dist="25400" dir="14640000" algn="tl" rotWithShape="0">
+                    <a:schemeClr val="bg1">
+                      <a:alpha val="30000"/>
+                    </a:schemeClr>
+                  </a:outerShdw>
+                </a:effectLst>
+                <a:latin typeface="+mn-lt"/>
+                <a:ea typeface="+mn-ea"/>
+                <a:cs typeface="+mn-cs"/>
+              </a:defRPr>
+            </a:lvl2pPr>
+            <a:lvl3pPr marL="1026000" indent="-216000" algn="l" defTabSz="457200" rtl="0" eaLnBrk="1" latinLnBrk="0" hangingPunct="1">
+              <a:spcBef>
+                <a:spcPct val="20000"/>
+              </a:spcBef>
+              <a:spcAft>
+                <a:spcPts val="600"/>
+              </a:spcAft>
+              <a:buClr>
+                <a:schemeClr val="tx2"/>
+              </a:buClr>
+              <a:buSzPct val="70000"/>
+              <a:buFont typeface="Wingdings 2" charset="2"/>
+              <a:buChar char=""/>
+              <a:defRPr sz="1800" kern="1200">
+                <a:ln>
+                  <a:solidFill>
+                    <a:schemeClr val="bg1">
+                      <a:lumMod val="75000"/>
+                      <a:lumOff val="25000"/>
+                      <a:alpha val="10000"/>
+                    </a:schemeClr>
+                  </a:solidFill>
+                </a:ln>
+                <a:solidFill>
+                  <a:schemeClr val="tx2"/>
+                </a:solidFill>
+                <a:effectLst>
+                  <a:outerShdw blurRad="9525" dist="25400" dir="14640000" algn="tl" rotWithShape="0">
+                    <a:schemeClr val="bg1">
+                      <a:alpha val="30000"/>
+                    </a:schemeClr>
+                  </a:outerShdw>
+                </a:effectLst>
+                <a:latin typeface="+mn-lt"/>
+                <a:ea typeface="+mn-ea"/>
+                <a:cs typeface="+mn-cs"/>
+              </a:defRPr>
+            </a:lvl3pPr>
+            <a:lvl4pPr marL="1386000" indent="-216000" algn="l" defTabSz="457200" rtl="0" eaLnBrk="1" latinLnBrk="0" hangingPunct="1">
+              <a:spcBef>
+                <a:spcPct val="20000"/>
+              </a:spcBef>
+              <a:spcAft>
+                <a:spcPts val="600"/>
+              </a:spcAft>
+              <a:buClr>
+                <a:schemeClr val="tx2"/>
+              </a:buClr>
+              <a:buSzPct val="70000"/>
+              <a:buFont typeface="Wingdings 2" charset="2"/>
+              <a:buChar char=""/>
+              <a:defRPr sz="1600" kern="1200">
+                <a:ln>
+                  <a:solidFill>
+                    <a:schemeClr val="bg1">
+                      <a:lumMod val="75000"/>
+                      <a:lumOff val="25000"/>
+                      <a:alpha val="10000"/>
+                    </a:schemeClr>
+                  </a:solidFill>
+                </a:ln>
+                <a:solidFill>
+                  <a:schemeClr val="tx2"/>
+                </a:solidFill>
+                <a:effectLst>
+                  <a:outerShdw blurRad="9525" dist="25400" dir="14640000" algn="tl" rotWithShape="0">
+                    <a:schemeClr val="bg1">
+                      <a:alpha val="30000"/>
+                    </a:schemeClr>
+                  </a:outerShdw>
+                </a:effectLst>
+                <a:latin typeface="+mn-lt"/>
+                <a:ea typeface="+mn-ea"/>
+                <a:cs typeface="+mn-cs"/>
+              </a:defRPr>
+            </a:lvl4pPr>
+            <a:lvl5pPr marL="1674000" indent="-216000" algn="l" defTabSz="457200" rtl="0" eaLnBrk="1" latinLnBrk="0" hangingPunct="1">
+              <a:spcBef>
+                <a:spcPct val="20000"/>
+              </a:spcBef>
+              <a:spcAft>
+                <a:spcPts val="600"/>
+              </a:spcAft>
+              <a:buClr>
+                <a:schemeClr val="tx2"/>
+              </a:buClr>
+              <a:buSzPct val="70000"/>
+              <a:buFont typeface="Wingdings 2" charset="2"/>
+              <a:buChar char=""/>
+              <a:defRPr sz="1600" kern="1200">
+                <a:ln>
+                  <a:solidFill>
+                    <a:schemeClr val="bg1">
+                      <a:lumMod val="75000"/>
+                      <a:lumOff val="25000"/>
+                      <a:alpha val="10000"/>
+                    </a:schemeClr>
+                  </a:solidFill>
+                </a:ln>
+                <a:solidFill>
+                  <a:schemeClr val="tx2"/>
+                </a:solidFill>
+                <a:effectLst>
+                  <a:outerShdw blurRad="9525" dist="25400" dir="14640000" algn="tl" rotWithShape="0">
+                    <a:schemeClr val="bg1">
+                      <a:alpha val="30000"/>
+                    </a:schemeClr>
+                  </a:outerShdw>
+                </a:effectLst>
+                <a:latin typeface="+mn-lt"/>
+                <a:ea typeface="+mn-ea"/>
+                <a:cs typeface="+mn-cs"/>
+              </a:defRPr>
+            </a:lvl5pPr>
+            <a:lvl6pPr marL="2014600" indent="-228600" algn="l" defTabSz="457200" rtl="0" eaLnBrk="1" latinLnBrk="0" hangingPunct="1">
+              <a:spcBef>
+                <a:spcPct val="20000"/>
+              </a:spcBef>
+              <a:spcAft>
+                <a:spcPts val="600"/>
+              </a:spcAft>
+              <a:buClr>
+                <a:schemeClr val="tx2"/>
+              </a:buClr>
+              <a:buSzPct val="70000"/>
+              <a:buFont typeface="Wingdings 2" charset="2"/>
+              <a:buChar char=""/>
+              <a:defRPr sz="1400" kern="1200">
+                <a:ln>
+                  <a:solidFill>
+                    <a:schemeClr val="bg1">
+                      <a:lumMod val="75000"/>
+                      <a:lumOff val="25000"/>
+                      <a:alpha val="10000"/>
+                    </a:schemeClr>
+                  </a:solidFill>
+                </a:ln>
+                <a:solidFill>
+                  <a:schemeClr val="tx2"/>
+                </a:solidFill>
+                <a:effectLst>
+                  <a:outerShdw blurRad="9525" dist="25400" dir="14640000" algn="tl" rotWithShape="0">
+                    <a:schemeClr val="bg1">
+                      <a:alpha val="30000"/>
+                    </a:schemeClr>
+                  </a:outerShdw>
+                </a:effectLst>
+                <a:latin typeface="+mn-lt"/>
+                <a:ea typeface="+mn-ea"/>
+                <a:cs typeface="+mn-cs"/>
+              </a:defRPr>
+            </a:lvl6pPr>
+            <a:lvl7pPr marL="2401800" indent="-228600" algn="l" defTabSz="457200" rtl="0" eaLnBrk="1" latinLnBrk="0" hangingPunct="1">
+              <a:spcBef>
+                <a:spcPct val="20000"/>
+              </a:spcBef>
+              <a:spcAft>
+                <a:spcPts val="600"/>
+              </a:spcAft>
+              <a:buClr>
+                <a:schemeClr val="tx2"/>
+              </a:buClr>
+              <a:buSzPct val="70000"/>
+              <a:buFont typeface="Wingdings 2" charset="2"/>
+              <a:buChar char=""/>
+              <a:defRPr sz="1400" kern="1200">
+                <a:ln>
+                  <a:solidFill>
+                    <a:schemeClr val="bg1">
+                      <a:lumMod val="75000"/>
+                      <a:lumOff val="25000"/>
+                      <a:alpha val="10000"/>
+                    </a:schemeClr>
+                  </a:solidFill>
+                </a:ln>
+                <a:solidFill>
+                  <a:schemeClr val="tx2"/>
+                </a:solidFill>
+                <a:effectLst>
+                  <a:outerShdw blurRad="9525" dist="25400" dir="14640000" algn="tl" rotWithShape="0">
+                    <a:schemeClr val="bg1">
+                      <a:alpha val="30000"/>
+                    </a:schemeClr>
+                  </a:outerShdw>
+                </a:effectLst>
+                <a:latin typeface="+mn-lt"/>
+                <a:ea typeface="+mn-ea"/>
+                <a:cs typeface="+mn-cs"/>
+              </a:defRPr>
+            </a:lvl7pPr>
+            <a:lvl8pPr marL="2789000" indent="-228600" algn="l" defTabSz="457200" rtl="0" eaLnBrk="1" latinLnBrk="0" hangingPunct="1">
+              <a:spcBef>
+                <a:spcPct val="20000"/>
+              </a:spcBef>
+              <a:spcAft>
+                <a:spcPts val="600"/>
+              </a:spcAft>
+              <a:buClr>
+                <a:schemeClr val="tx2"/>
+              </a:buClr>
+              <a:buSzPct val="70000"/>
+              <a:buFont typeface="Wingdings 2" charset="2"/>
+              <a:buChar char=""/>
+              <a:defRPr sz="1400" kern="1200">
+                <a:ln>
+                  <a:solidFill>
+                    <a:schemeClr val="bg1">
+                      <a:lumMod val="75000"/>
+                      <a:lumOff val="25000"/>
+                      <a:alpha val="10000"/>
+                    </a:schemeClr>
+                  </a:solidFill>
+                </a:ln>
+                <a:solidFill>
+                  <a:schemeClr val="tx2"/>
+                </a:solidFill>
+                <a:effectLst>
+                  <a:outerShdw blurRad="9525" dist="25400" dir="14640000" algn="tl" rotWithShape="0">
+                    <a:schemeClr val="bg1">
+                      <a:alpha val="30000"/>
+                    </a:schemeClr>
+                  </a:outerShdw>
+                </a:effectLst>
+                <a:latin typeface="+mn-lt"/>
+                <a:ea typeface="+mn-ea"/>
+                <a:cs typeface="+mn-cs"/>
+              </a:defRPr>
+            </a:lvl8pPr>
+            <a:lvl9pPr marL="3106200" indent="-228600" algn="l" defTabSz="457200" rtl="0" eaLnBrk="1" latinLnBrk="0" hangingPunct="1">
+              <a:spcBef>
+                <a:spcPct val="20000"/>
+              </a:spcBef>
+              <a:spcAft>
+                <a:spcPts val="600"/>
+              </a:spcAft>
+              <a:buClr>
+                <a:schemeClr val="tx2"/>
+              </a:buClr>
+              <a:buSzPct val="70000"/>
+              <a:buFont typeface="Wingdings 2" charset="2"/>
+              <a:buChar char=""/>
+              <a:defRPr sz="1400" kern="1200">
+                <a:ln>
+                  <a:solidFill>
+                    <a:schemeClr val="bg1">
+                      <a:lumMod val="75000"/>
+                      <a:lumOff val="25000"/>
+                      <a:alpha val="10000"/>
+                    </a:schemeClr>
+                  </a:solidFill>
+                </a:ln>
+                <a:solidFill>
+                  <a:schemeClr val="tx2"/>
+                </a:solidFill>
+                <a:effectLst>
+                  <a:outerShdw blurRad="9525" dist="25400" dir="14640000" algn="tl" rotWithShape="0">
+                    <a:schemeClr val="bg1">
+                      <a:alpha val="30000"/>
+                    </a:schemeClr>
+                  </a:outerShdw>
+                </a:effectLst>
+                <a:latin typeface="+mn-lt"/>
+                <a:ea typeface="+mn-ea"/>
+                <a:cs typeface="+mn-cs"/>
+              </a:defRPr>
+            </a:lvl9pPr>
+          </a:lstStyle>
+          <a:p>
+            <a:pPr marL="36900" indent="0">
+              <a:buFont typeface="Wingdings 2" charset="2"/>
+              <a:buNone/>
+            </a:pPr>
+            <a:r>
+              <a:rPr lang="es-GT" dirty="0"/>
+              <a:t>Modelo 2</a:t>
+            </a:r>
+          </a:p>
+          <a:p>
+            <a:r>
+              <a:rPr lang="es-GT" dirty="0"/>
+              <a:t>Precisión de 93%</a:t>
+            </a:r>
+          </a:p>
+          <a:p>
+            <a:r>
+              <a:rPr lang="es-GT" dirty="0"/>
+              <a:t>Bastantes casos de falsos negativos</a:t>
+            </a:r>
+          </a:p>
+          <a:p>
+            <a:r>
+              <a:rPr lang="es-GT" dirty="0"/>
+              <a:t>Pocos casos de falsos positivos</a:t>
+            </a:r>
+          </a:p>
+          <a:p>
+            <a:r>
+              <a:rPr lang="es-GT" dirty="0"/>
+              <a:t>0 = “Tumor Maligno”</a:t>
+            </a:r>
+          </a:p>
+          <a:p>
+            <a:r>
+              <a:rPr lang="es-GT" dirty="0"/>
+              <a:t>1 = “Tumor Benigno”</a:t>
+            </a:r>
+          </a:p>
+          <a:p>
+            <a:r>
+              <a:rPr lang="es-GT" dirty="0"/>
+              <a:t>Resultados satisfactorios</a:t>
+            </a:r>
+          </a:p>
+        </p:txBody>
+      </p:sp>
+      <p:pic>
+        <p:nvPicPr>
+          <p:cNvPr id="8" name="Imagen 7">
+            <a:extLst>
+              <a:ext uri="{FF2B5EF4-FFF2-40B4-BE49-F238E27FC236}">
+                <a16:creationId xmlns:a16="http://schemas.microsoft.com/office/drawing/2014/main" id="{3E947B56-8044-529C-2B8D-071FDFB47938}"/>
+              </a:ext>
+            </a:extLst>
+          </p:cNvPr>
+          <p:cNvPicPr>
+            <a:picLocks noChangeAspect="1"/>
+          </p:cNvPicPr>
+          <p:nvPr/>
+        </p:nvPicPr>
+        <p:blipFill>
+          <a:blip r:embed="rId3"/>
+          <a:stretch>
+            <a:fillRect/>
+          </a:stretch>
+        </p:blipFill>
+        <p:spPr>
+          <a:xfrm>
+            <a:off x="7786103" y="414587"/>
+            <a:ext cx="3533775" cy="3448050"/>
+          </a:xfrm>
+          <a:prstGeom prst="rect">
+            <a:avLst/>
+          </a:prstGeom>
+        </p:spPr>
+      </p:pic>
     </p:spTree>
     <p:extLst>
       <p:ext uri="{BB962C8B-B14F-4D97-AF65-F5344CB8AC3E}">
@@ -10181,6 +10733,24 @@
 </file>
 
 <file path=customXml/item1.xml><?xml version="1.0" encoding="utf-8"?>
+<?mso-contentType ?>
+<FormTemplates xmlns="http://schemas.microsoft.com/sharepoint/v3/contenttype/forms">
+  <Display>DocumentLibraryForm</Display>
+  <Edit>DocumentLibraryForm</Edit>
+  <New>DocumentLibraryForm</New>
+</FormTemplates>
+</file>
+
+<file path=customXml/item2.xml><?xml version="1.0" encoding="utf-8"?>
+<p:properties xmlns:p="http://schemas.microsoft.com/office/2006/metadata/properties" xmlns:xsi="http://www.w3.org/2001/XMLSchema-instance" xmlns:pc="http://schemas.microsoft.com/office/infopath/2007/PartnerControls">
+  <documentManagement>
+    <Status xmlns="71af3243-3dd4-4a8d-8c0d-dd76da1f02a5">Not started</Status>
+    <MediaServiceKeyPoints xmlns="71af3243-3dd4-4a8d-8c0d-dd76da1f02a5" xsi:nil="true"/>
+  </documentManagement>
+</p:properties>
+</file>
+
+<file path=customXml/item3.xml><?xml version="1.0" encoding="utf-8"?>
 <ct:contentTypeSchema xmlns:ct="http://schemas.microsoft.com/office/2006/metadata/contentType" xmlns:ma="http://schemas.microsoft.com/office/2006/metadata/properties/metaAttributes" ct:_="" ma:_="" ma:contentTypeName="Document" ma:contentTypeID="0x01010079F111ED35F8CC479449609E8A0923A6" ma:contentTypeVersion="12" ma:contentTypeDescription="Create a new document." ma:contentTypeScope="" ma:versionID="a410dd7f93c95333ffa1b60ed6adedd1">
   <xsd:schema xmlns:xsd="http://www.w3.org/2001/XMLSchema" xmlns:xs="http://www.w3.org/2001/XMLSchema" xmlns:p="http://schemas.microsoft.com/office/2006/metadata/properties" xmlns:ns2="71af3243-3dd4-4a8d-8c0d-dd76da1f02a5" xmlns:ns3="16c05727-aa75-4e4a-9b5f-8a80a1165891" targetNamespace="http://schemas.microsoft.com/office/2006/metadata/properties" ma:root="true" ma:fieldsID="a936d9baba76aa3866493feff160faab" ns2:_="" ns3:_="">
     <xsd:import namespace="71af3243-3dd4-4a8d-8c0d-dd76da1f02a5"/>
@@ -10401,25 +10971,25 @@
 </ct:contentTypeSchema>
 </file>
 
-<file path=customXml/item2.xml><?xml version="1.0" encoding="utf-8"?>
-<p:properties xmlns:p="http://schemas.microsoft.com/office/2006/metadata/properties" xmlns:xsi="http://www.w3.org/2001/XMLSchema-instance" xmlns:pc="http://schemas.microsoft.com/office/infopath/2007/PartnerControls">
-  <documentManagement>
-    <Status xmlns="71af3243-3dd4-4a8d-8c0d-dd76da1f02a5">Not started</Status>
-    <MediaServiceKeyPoints xmlns="71af3243-3dd4-4a8d-8c0d-dd76da1f02a5" xsi:nil="true"/>
-  </documentManagement>
-</p:properties>
+<file path=customXml/itemProps1.xml><?xml version="1.0" encoding="utf-8"?>
+<ds:datastoreItem xmlns:ds="http://schemas.openxmlformats.org/officeDocument/2006/customXml" ds:itemID="{64B270AB-C138-415C-897E-3C24487DECF1}">
+  <ds:schemaRefs>
+    <ds:schemaRef ds:uri="http://schemas.microsoft.com/sharepoint/v3/contenttype/forms"/>
+  </ds:schemaRefs>
+</ds:datastoreItem>
 </file>
 
-<file path=customXml/item3.xml><?xml version="1.0" encoding="utf-8"?>
-<?mso-contentType ?>
-<FormTemplates xmlns="http://schemas.microsoft.com/sharepoint/v3/contenttype/forms">
-  <Display>DocumentLibraryForm</Display>
-  <Edit>DocumentLibraryForm</Edit>
-  <New>DocumentLibraryForm</New>
-</FormTemplates>
+<file path=customXml/itemProps2.xml><?xml version="1.0" encoding="utf-8"?>
+<ds:datastoreItem xmlns:ds="http://schemas.openxmlformats.org/officeDocument/2006/customXml" ds:itemID="{2C4C00F4-06E9-43E3-AD97-88A857CEFA82}">
+  <ds:schemaRefs>
+    <ds:schemaRef ds:uri="http://schemas.microsoft.com/office/2006/metadata/properties"/>
+    <ds:schemaRef ds:uri="http://schemas.microsoft.com/office/infopath/2007/PartnerControls"/>
+    <ds:schemaRef ds:uri="71af3243-3dd4-4a8d-8c0d-dd76da1f02a5"/>
+  </ds:schemaRefs>
+</ds:datastoreItem>
 </file>
 
-<file path=customXml/itemProps1.xml><?xml version="1.0" encoding="utf-8"?>
+<file path=customXml/itemProps3.xml><?xml version="1.0" encoding="utf-8"?>
 <ds:datastoreItem xmlns:ds="http://schemas.openxmlformats.org/officeDocument/2006/customXml" ds:itemID="{0585E981-8C91-4205-A0C3-C991F42B4C9E}">
   <ds:schemaRefs>
     <ds:schemaRef ds:uri="http://schemas.microsoft.com/office/2006/metadata/contentType"/>
@@ -10436,22 +11006,4 @@
     <ds:schemaRef ds:uri="http://schemas.microsoft.com/internal/obd"/>
   </ds:schemaRefs>
 </ds:datastoreItem>
-</file>
-
-<file path=customXml/itemProps2.xml><?xml version="1.0" encoding="utf-8"?>
-<ds:datastoreItem xmlns:ds="http://schemas.openxmlformats.org/officeDocument/2006/customXml" ds:itemID="{2C4C00F4-06E9-43E3-AD97-88A857CEFA82}">
-  <ds:schemaRefs>
-    <ds:schemaRef ds:uri="http://schemas.microsoft.com/office/2006/metadata/properties"/>
-    <ds:schemaRef ds:uri="http://schemas.microsoft.com/office/infopath/2007/PartnerControls"/>
-    <ds:schemaRef ds:uri="71af3243-3dd4-4a8d-8c0d-dd76da1f02a5"/>
-  </ds:schemaRefs>
-</ds:datastoreItem>
-</file>
-
-<file path=customXml/itemProps3.xml><?xml version="1.0" encoding="utf-8"?>
-<ds:datastoreItem xmlns:ds="http://schemas.openxmlformats.org/officeDocument/2006/customXml" ds:itemID="{64B270AB-C138-415C-897E-3C24487DECF1}">
-  <ds:schemaRefs>
-    <ds:schemaRef ds:uri="http://schemas.microsoft.com/sharepoint/v3/contenttype/forms"/>
-  </ds:schemaRefs>
-</ds:datastoreItem>
 </file>
</xml_diff>